<commit_message>
Added extra slides for NUCLEI 2019 meeting.
</commit_message>
<xml_diff>
--- a/Presentations/NUCLEI_May2019/tropiano_highlight.pptx
+++ b/Presentations/NUCLEI_May2019/tropiano_highlight.pptx
@@ -4362,8 +4362,8 @@
           </a:p>
         </p:txBody>
       </p:sp>
-      <mc:AlternateContent xmlns:mc="http://schemas.openxmlformats.org/markup-compatibility/2006" xmlns:a14="http://schemas.microsoft.com/office/drawing/2010/main">
-        <mc:Choice Requires="a14">
+      <mc:AlternateContent xmlns:mc="http://schemas.openxmlformats.org/markup-compatibility/2006">
+        <mc:Choice xmlns:a14="http://schemas.microsoft.com/office/drawing/2010/main" Requires="a14">
           <p:sp>
             <p:nvSpPr>
               <p:cNvPr id="3079" name="Text Box 7">
@@ -4709,7 +4709,16 @@
                         <a:cs typeface="Calibri" panose="020F0502020204030204" pitchFamily="34" charset="0"/>
                         <a:sym typeface="Calibri" panose="020F0502020204030204" pitchFamily="34" charset="0"/>
                       </a:rPr>
-                      <m:t>1.2</m:t>
+                      <m:t>1.</m:t>
+                    </m:r>
+                    <m:r>
+                      <a:rPr lang="en-US" altLang="en-US" sz="2000" b="0" i="1" smtClean="0">
+                        <a:latin typeface="Cambria Math" panose="02040503050406030204" pitchFamily="18" charset="0"/>
+                        <a:ea typeface="Calibri" panose="020F0502020204030204" pitchFamily="34" charset="0"/>
+                        <a:cs typeface="Calibri" panose="020F0502020204030204" pitchFamily="34" charset="0"/>
+                        <a:sym typeface="Calibri" panose="020F0502020204030204" pitchFamily="34" charset="0"/>
+                      </a:rPr>
+                      <m:t>5</m:t>
                     </m:r>
                   </m:oMath>
                 </a14:m>
@@ -4744,7 +4753,7 @@
             </p:txBody>
           </p:sp>
         </mc:Choice>
-        <mc:Fallback xmlns="">
+        <mc:Fallback>
           <p:sp>
             <p:nvSpPr>
               <p:cNvPr id="3079" name="Text Box 7">

</xml_diff>